<commit_message>
[2023-03-06] RMS(v3.0) - summary pptx 경로 수정
</commit_message>
<xml_diff>
--- a/src/main/webapp/WEB-INF/Files/2023-02/27/summary2023-02-27.pptx
+++ b/src/main/webapp/WEB-INF/Files/2023-02/27/summary2023-02-27.pptx
@@ -85,7 +85,7 @@
       </p:grpSpPr>
       <p:sp>
         <p:nvSpPr>
-          <p:cNvPr id="1801342547" name="Text">
+          <p:cNvPr id="2119826857" name="Text">
     </p:cNvPr>
           <p:cNvSpPr>
             <a:spLocks noGrp="1"/>
@@ -131,7 +131,7 @@
       </p:sp>
       <p:sp>
         <p:nvSpPr>
-          <p:cNvPr id="1474150980" name="Text">
+          <p:cNvPr id="1008738950" name="Text">
     </p:cNvPr>
           <p:cNvSpPr>
             <a:spLocks noGrp="1"/>
@@ -195,7 +195,7 @@
       </p:sp>
       <p:sp>
         <p:nvSpPr>
-          <p:cNvPr id="1315451450" name="Rectangle"/>
+          <p:cNvPr id="1046975485" name="Rectangle"/>
           <p:cNvSpPr>
             <a:spLocks noGrp="1"/>
           </p:cNvSpPr>
@@ -229,7 +229,7 @@
       </p:sp>
       <p:sp>
         <p:nvSpPr>
-          <p:cNvPr id="635580122" name="Rectangle"/>
+          <p:cNvPr id="934419066" name="Rectangle"/>
           <p:cNvSpPr>
             <a:spLocks noGrp="1"/>
           </p:cNvSpPr>
@@ -263,7 +263,7 @@
       </p:sp>
       <p:sp>
         <p:nvSpPr>
-          <p:cNvPr id="870563526" name="Rectangle"/>
+          <p:cNvPr id="112659856" name="Rectangle"/>
           <p:cNvSpPr>
             <a:spLocks noGrp="1"/>
           </p:cNvSpPr>
@@ -297,7 +297,7 @@
       </p:sp>
       <p:sp>
         <p:nvSpPr>
-          <p:cNvPr id="177571100" name="Text">
+          <p:cNvPr id="1002318802" name="Text">
     </p:cNvPr>
           <p:cNvSpPr>
             <a:spLocks noGrp="1"/>
@@ -346,7 +346,7 @@
       </p:sp>
       <p:sp>
         <p:nvSpPr>
-          <p:cNvPr id="98803606" name="Text">
+          <p:cNvPr id="960802595" name="Text">
     </p:cNvPr>
           <p:cNvSpPr>
             <a:spLocks noGrp="1"/>
@@ -395,7 +395,7 @@
       </p:sp>
       <p:sp>
         <p:nvSpPr>
-          <p:cNvPr id="826533134" name="Text">
+          <p:cNvPr id="503448507" name="Text">
     </p:cNvPr>
           <p:cNvSpPr>
             <a:spLocks noGrp="1"/>
@@ -433,7 +433,7 @@
       </p:sp>
       <p:sp>
         <p:nvSpPr>
-          <p:cNvPr id="536373358" name="Text">
+          <p:cNvPr id="543643238" name="Text">
     </p:cNvPr>
           <p:cNvSpPr>
             <a:spLocks noGrp="1"/>
@@ -498,7 +498,7 @@
       </p:sp>
       <p:sp>
         <p:nvSpPr>
-          <p:cNvPr id="971224040" name="Text">
+          <p:cNvPr id="1783437571" name="Text">
     </p:cNvPr>
           <p:cNvSpPr>
             <a:spLocks noGrp="1"/>
@@ -580,7 +580,7 @@
       </p:sp>
       <p:sp>
         <p:nvSpPr>
-          <p:cNvPr id="543528045" name="Text">
+          <p:cNvPr id="1986830046" name="Text">
     </p:cNvPr>
           <p:cNvSpPr>
             <a:spLocks noGrp="1"/>
@@ -632,7 +632,7 @@
       </p:sp>
       <p:sp>
         <p:nvSpPr>
-          <p:cNvPr id="245395194" name="Text">
+          <p:cNvPr id="2021479539" name="Text">
     </p:cNvPr>
           <p:cNvSpPr>
             <a:spLocks noGrp="1"/>
@@ -681,7 +681,7 @@
       </p:sp>
       <p:sp>
         <p:nvSpPr>
-          <p:cNvPr id="1388829784" name="Text">
+          <p:cNvPr id="1647569276" name="Text">
     </p:cNvPr>
           <p:cNvSpPr>
             <a:spLocks noGrp="1"/>
@@ -730,7 +730,7 @@
       </p:sp>
       <p:sp>
         <p:nvSpPr>
-          <p:cNvPr id="1981765915" name="Text">
+          <p:cNvPr id="1622438200" name="Text">
     </p:cNvPr>
           <p:cNvSpPr>
             <a:spLocks noGrp="1"/>
@@ -785,7 +785,7 @@
       </p:sp>
       <p:sp>
         <p:nvSpPr>
-          <p:cNvPr id="2060811593" name="Text">
+          <p:cNvPr id="1916574110" name="Text">
     </p:cNvPr>
           <p:cNvSpPr>
             <a:spLocks noGrp="1"/>
@@ -840,7 +840,7 @@
       </p:sp>
       <p:sp>
         <p:nvSpPr>
-          <p:cNvPr id="2005863255" name="Text">
+          <p:cNvPr id="1617991014" name="Text">
     </p:cNvPr>
           <p:cNvSpPr>
             <a:spLocks noGrp="1"/>
@@ -895,7 +895,7 @@
       </p:sp>
       <p:sp>
         <p:nvSpPr>
-          <p:cNvPr id="465976546" name="Text">
+          <p:cNvPr id="494266397" name="Text">
     </p:cNvPr>
           <p:cNvSpPr>
             <a:spLocks noGrp="1"/>
@@ -959,7 +959,7 @@
       </p:sp>
       <p:sp>
         <p:nvSpPr>
-          <p:cNvPr id="387803392" name="Text">
+          <p:cNvPr id="1577805626" name="Text">
     </p:cNvPr>
           <p:cNvSpPr>
             <a:spLocks noGrp="1"/>
@@ -1014,7 +1014,7 @@
       </p:sp>
       <p:sp>
         <p:nvSpPr>
-          <p:cNvPr id="1181966751" name="Text">
+          <p:cNvPr id="1223554316" name="Text">
     </p:cNvPr>
           <p:cNvSpPr>
             <a:spLocks noGrp="1"/>
@@ -1069,7 +1069,7 @@
       </p:sp>
       <p:sp>
         <p:nvSpPr>
-          <p:cNvPr id="1235816373" name="Text">
+          <p:cNvPr id="751993554" name="Text">
     </p:cNvPr>
           <p:cNvSpPr>
             <a:spLocks noGrp="1"/>
@@ -1124,7 +1124,7 @@
       </p:sp>
       <p:sp>
         <p:nvSpPr>
-          <p:cNvPr id="1671564110" name="Text">
+          <p:cNvPr id="508928597" name="Text">
     </p:cNvPr>
           <p:cNvSpPr>
             <a:spLocks noGrp="1"/>
@@ -1179,7 +1179,7 @@
       </p:sp>
       <p:sp>
         <p:nvSpPr>
-          <p:cNvPr id="520829779" name="Text">
+          <p:cNvPr id="459416594" name="Text">
     </p:cNvPr>
           <p:cNvSpPr>
             <a:spLocks noGrp="1"/>
@@ -1234,7 +1234,7 @@
       </p:sp>
       <p:sp>
         <p:nvSpPr>
-          <p:cNvPr id="1118424756" name="Text">
+          <p:cNvPr id="1006696423" name="Text">
     </p:cNvPr>
           <p:cNvSpPr>
             <a:spLocks noGrp="1"/>
@@ -1289,7 +1289,7 @@
       </p:sp>
       <p:sp>
         <p:nvSpPr>
-          <p:cNvPr id="1132246515" name="Text">
+          <p:cNvPr id="83633831" name="Text">
     </p:cNvPr>
           <p:cNvSpPr>
             <a:spLocks noGrp="1"/>
@@ -1327,7 +1327,7 @@
       </p:sp>
       <p:sp>
         <p:nvSpPr>
-          <p:cNvPr id="821509801" name="Text">
+          <p:cNvPr id="923298663" name="Text">
     </p:cNvPr>
           <p:cNvSpPr>
             <a:spLocks noGrp="1"/>
@@ -1401,7 +1401,7 @@
       </p:sp>
       <p:sp>
         <p:nvSpPr>
-          <p:cNvPr id="1994410567" name="Text">
+          <p:cNvPr id="1027640096" name="Text">
     </p:cNvPr>
           <p:cNvSpPr>
             <a:spLocks noGrp="1"/>
@@ -1483,7 +1483,7 @@
       </p:sp>
       <p:sp>
         <p:nvSpPr>
-          <p:cNvPr id="2050025025" name="Text">
+          <p:cNvPr id="113568928" name="Text">
     </p:cNvPr>
           <p:cNvSpPr>
             <a:spLocks noGrp="1"/>
@@ -1535,7 +1535,7 @@
       </p:sp>
       <p:sp>
         <p:nvSpPr>
-          <p:cNvPr id="1548027865" name="Rectangle"/>
+          <p:cNvPr id="1676159937" name="Rectangle"/>
           <p:cNvSpPr>
             <a:spLocks noGrp="1"/>
           </p:cNvSpPr>
@@ -1569,7 +1569,7 @@
       </p:sp>
       <p:sp>
         <p:nvSpPr>
-          <p:cNvPr id="1439594638" name="Text">
+          <p:cNvPr id="391063432" name="Text">
     </p:cNvPr>
           <p:cNvSpPr>
             <a:spLocks noGrp="1"/>
@@ -1618,7 +1618,7 @@
       </p:sp>
       <p:sp>
         <p:nvSpPr>
-          <p:cNvPr id="562602498" name="Text">
+          <p:cNvPr id="787457994" name="Text">
     </p:cNvPr>
           <p:cNvSpPr>
             <a:spLocks noGrp="1"/>
@@ -1670,7 +1670,7 @@
       </p:sp>
       <p:sp>
         <p:nvSpPr>
-          <p:cNvPr id="1559710364" name="Text">
+          <p:cNvPr id="267382619" name="Text">
     </p:cNvPr>
           <p:cNvSpPr>
             <a:spLocks noGrp="1"/>
@@ -1722,7 +1722,7 @@
       </p:sp>
       <p:sp>
         <p:nvSpPr>
-          <p:cNvPr id="687404308" name="Text">
+          <p:cNvPr id="763063108" name="Text">
     </p:cNvPr>
           <p:cNvSpPr>
             <a:spLocks noGrp="1"/>
@@ -1774,7 +1774,7 @@
       </p:sp>
       <p:sp>
         <p:nvSpPr>
-          <p:cNvPr id="240448141" name="Text">
+          <p:cNvPr id="1139173892" name="Text">
     </p:cNvPr>
           <p:cNvSpPr>
             <a:spLocks noGrp="1"/>
@@ -1829,7 +1829,7 @@
       </p:sp>
       <p:sp>
         <p:nvSpPr>
-          <p:cNvPr id="1789446647" name="Text">
+          <p:cNvPr id="275006533" name="Text">
     </p:cNvPr>
           <p:cNvSpPr>
             <a:spLocks noGrp="1"/>
@@ -1884,7 +1884,7 @@
       </p:sp>
       <p:sp>
         <p:nvSpPr>
-          <p:cNvPr id="216915348" name="Text">
+          <p:cNvPr id="1610736677" name="Text">
     </p:cNvPr>
           <p:cNvSpPr>
             <a:spLocks noGrp="1"/>
@@ -1939,7 +1939,7 @@
       </p:sp>
       <p:sp>
         <p:nvSpPr>
-          <p:cNvPr id="1666373960" name="Text">
+          <p:cNvPr id="374772266" name="Text">
     </p:cNvPr>
           <p:cNvSpPr>
             <a:spLocks noGrp="1"/>
@@ -1991,7 +1991,7 @@
       </p:sp>
       <p:sp>
         <p:nvSpPr>
-          <p:cNvPr id="1253809973" name="Text">
+          <p:cNvPr id="1720745134" name="Text">
     </p:cNvPr>
           <p:cNvSpPr>
             <a:spLocks noGrp="1"/>
@@ -2043,7 +2043,7 @@
       </p:sp>
       <p:sp>
         <p:nvSpPr>
-          <p:cNvPr id="1727008996" name="Text">
+          <p:cNvPr id="1424247381" name="Text">
     </p:cNvPr>
           <p:cNvSpPr>
             <a:spLocks noGrp="1"/>
@@ -2095,7 +2095,7 @@
       </p:sp>
       <p:sp>
         <p:nvSpPr>
-          <p:cNvPr id="76767443" name="Text">
+          <p:cNvPr id="992721952" name="Text">
     </p:cNvPr>
           <p:cNvSpPr>
             <a:spLocks noGrp="1"/>
@@ -2147,7 +2147,7 @@
       </p:sp>
       <p:sp>
         <p:nvSpPr>
-          <p:cNvPr id="1904107920" name="Text">
+          <p:cNvPr id="432979629" name="Text">
     </p:cNvPr>
           <p:cNvSpPr>
             <a:spLocks noGrp="1"/>
@@ -2199,7 +2199,7 @@
       </p:sp>
       <p:sp>
         <p:nvSpPr>
-          <p:cNvPr id="1730812605" name="Text">
+          <p:cNvPr id="2094974006" name="Text">
     </p:cNvPr>
           <p:cNvSpPr>
             <a:spLocks noGrp="1"/>
@@ -2254,7 +2254,7 @@
       </p:sp>
       <p:sp>
         <p:nvSpPr>
-          <p:cNvPr id="29053324" name="Text">
+          <p:cNvPr id="178167578" name="Text">
     </p:cNvPr>
           <p:cNvSpPr>
             <a:spLocks noGrp="1"/>
@@ -2306,7 +2306,7 @@
       </p:sp>
       <p:sp>
         <p:nvSpPr>
-          <p:cNvPr id="514927760" name="Text">
+          <p:cNvPr id="1815279829" name="Text">
     </p:cNvPr>
           <p:cNvSpPr>
             <a:spLocks noGrp="1"/>
@@ -2361,7 +2361,7 @@
       </p:sp>
       <p:sp>
         <p:nvSpPr>
-          <p:cNvPr id="474070071" name="Text">
+          <p:cNvPr id="6621224" name="Text">
     </p:cNvPr>
           <p:cNvSpPr>
             <a:spLocks noGrp="1"/>
@@ -2413,7 +2413,7 @@
       </p:sp>
       <p:sp>
         <p:nvSpPr>
-          <p:cNvPr id="730440432" name="Text">
+          <p:cNvPr id="168858470" name="Text">
     </p:cNvPr>
           <p:cNvSpPr>
             <a:spLocks noGrp="1"/>
@@ -2465,7 +2465,7 @@
       </p:sp>
       <p:sp>
         <p:nvSpPr>
-          <p:cNvPr id="1894101308" name="Text">
+          <p:cNvPr id="1946729329" name="Text">
     </p:cNvPr>
           <p:cNvSpPr>
             <a:spLocks noGrp="1"/>
@@ -2517,7 +2517,7 @@
       </p:sp>
       <p:sp>
         <p:nvSpPr>
-          <p:cNvPr id="1739052572" name="Text">
+          <p:cNvPr id="260510069" name="Text">
     </p:cNvPr>
           <p:cNvSpPr>
             <a:spLocks noGrp="1"/>
@@ -2569,7 +2569,7 @@
       </p:sp>
       <p:sp>
         <p:nvSpPr>
-          <p:cNvPr id="1989574363" name="Text">
+          <p:cNvPr id="655064293" name="Text">
     </p:cNvPr>
           <p:cNvSpPr>
             <a:spLocks noGrp="1"/>
@@ -2621,7 +2621,7 @@
       </p:sp>
       <p:sp>
         <p:nvSpPr>
-          <p:cNvPr id="284089563" name="Text">
+          <p:cNvPr id="688799937" name="Text">
     </p:cNvPr>
           <p:cNvSpPr>
             <a:spLocks noGrp="1"/>
@@ -2673,7 +2673,7 @@
       </p:sp>
       <p:sp>
         <p:nvSpPr>
-          <p:cNvPr id="1298129835" name="Text">
+          <p:cNvPr id="418162082" name="Text">
     </p:cNvPr>
           <p:cNvSpPr>
             <a:spLocks noGrp="1"/>
@@ -2725,7 +2725,7 @@
       </p:sp>
       <p:sp>
         <p:nvSpPr>
-          <p:cNvPr id="336714538" name="Frame"/>
+          <p:cNvPr id="802624371" name="Frame"/>
           <p:cNvSpPr>
             <a:spLocks noGrp="1"/>
           </p:cNvSpPr>
@@ -2750,7 +2750,7 @@
       </p:sp>
       <p:sp>
         <p:nvSpPr>
-          <p:cNvPr id="1362366421" name="Text">
+          <p:cNvPr id="1405595192" name="Text">
     </p:cNvPr>
           <p:cNvSpPr>
             <a:spLocks noGrp="1"/>
@@ -2802,7 +2802,7 @@
       </p:sp>
       <p:sp>
         <p:nvSpPr>
-          <p:cNvPr id="928651564" name="Text">
+          <p:cNvPr id="143979721" name="Text">
     </p:cNvPr>
           <p:cNvSpPr>
             <a:spLocks noGrp="1"/>
@@ -2911,7 +2911,7 @@
       </p:sp>
       <p:sp>
         <p:nvSpPr>
-          <p:cNvPr id="86701783" name="Text">
+          <p:cNvPr id="1965593036" name="Text">
     </p:cNvPr>
           <p:cNvSpPr>
             <a:spLocks noGrp="1"/>
@@ -2949,7 +2949,7 @@
       </p:sp>
       <p:sp>
         <p:nvSpPr>
-          <p:cNvPr id="536389075" name="Text">
+          <p:cNvPr id="1660110993" name="Text">
     </p:cNvPr>
           <p:cNvSpPr>
             <a:spLocks noGrp="1"/>
@@ -3001,7 +3001,7 @@
       </p:sp>
       <p:sp>
         <p:nvSpPr>
-          <p:cNvPr id="1858296670" name="Text">
+          <p:cNvPr id="212573337" name="Text">
     </p:cNvPr>
           <p:cNvSpPr>
             <a:spLocks noGrp="1"/>
@@ -3077,7 +3077,7 @@
       </p:sp>
       <p:sp>
         <p:nvSpPr>
-          <p:cNvPr id="154643667" name="Text">
+          <p:cNvPr id="599131001" name="Text">
     </p:cNvPr>
           <p:cNvSpPr>
             <a:spLocks noGrp="1"/>
@@ -3129,7 +3129,7 @@
       </p:sp>
       <p:sp>
         <p:nvSpPr>
-          <p:cNvPr id="1534685036" name="Text">
+          <p:cNvPr id="312557618" name="Text">
     </p:cNvPr>
           <p:cNvSpPr>
             <a:spLocks noGrp="1"/>
@@ -3181,7 +3181,7 @@
       </p:sp>
       <p:sp>
         <p:nvSpPr>
-          <p:cNvPr id="32870381" name="Text">
+          <p:cNvPr id="1793996087" name="Text">
     </p:cNvPr>
           <p:cNvSpPr>
             <a:spLocks noGrp="1"/>
@@ -3233,7 +3233,7 @@
       </p:sp>
       <p:sp>
         <p:nvSpPr>
-          <p:cNvPr id="1964522790" name="Text">
+          <p:cNvPr id="980497319" name="Text">
     </p:cNvPr>
           <p:cNvSpPr>
             <a:spLocks noGrp="1"/>
@@ -3285,7 +3285,7 @@
       </p:sp>
       <p:sp>
         <p:nvSpPr>
-          <p:cNvPr id="1098729058" name="Text">
+          <p:cNvPr id="701452891" name="Text">
     </p:cNvPr>
           <p:cNvSpPr>
             <a:spLocks noGrp="1"/>
@@ -3358,7 +3358,7 @@
       </p:sp>
       <p:sp>
         <p:nvSpPr>
-          <p:cNvPr id="1374638894" name="Text">
+          <p:cNvPr id="829892480" name="Text">
     </p:cNvPr>
           <p:cNvSpPr>
             <a:spLocks noGrp="1"/>
@@ -3396,7 +3396,7 @@
       </p:sp>
       <p:sp>
         <p:nvSpPr>
-          <p:cNvPr id="2093495321" name="Text">
+          <p:cNvPr id="715909908" name="Text">
     </p:cNvPr>
           <p:cNvSpPr>
             <a:spLocks noGrp="1"/>
@@ -3448,7 +3448,7 @@
       </p:sp>
       <p:sp>
         <p:nvSpPr>
-          <p:cNvPr id="1208866731" name="Text">
+          <p:cNvPr id="435427821" name="Text">
     </p:cNvPr>
           <p:cNvSpPr>
             <a:spLocks noGrp="1"/>
@@ -3521,7 +3521,7 @@
       </p:sp>
       <p:sp>
         <p:nvSpPr>
-          <p:cNvPr id="1667815070" name="Text">
+          <p:cNvPr id="1257950466" name="Text">
     </p:cNvPr>
           <p:cNvSpPr>
             <a:spLocks noGrp="1"/>
@@ -3573,7 +3573,7 @@
       </p:sp>
       <p:sp>
         <p:nvSpPr>
-          <p:cNvPr id="1211473918" name="Text">
+          <p:cNvPr id="1111075066" name="Text">
     </p:cNvPr>
           <p:cNvSpPr>
             <a:spLocks noGrp="1"/>
@@ -3625,7 +3625,7 @@
       </p:sp>
       <p:sp>
         <p:nvSpPr>
-          <p:cNvPr id="1977618973" name="Text">
+          <p:cNvPr id="926877922" name="Text">
     </p:cNvPr>
           <p:cNvSpPr>
             <a:spLocks noGrp="1"/>
@@ -3677,7 +3677,7 @@
       </p:sp>
       <p:sp>
         <p:nvSpPr>
-          <p:cNvPr id="1408639877" name="Rectangle"/>
+          <p:cNvPr id="247284889" name="Rectangle"/>
           <p:cNvSpPr>
             <a:spLocks noGrp="1"/>
           </p:cNvSpPr>
@@ -3736,7 +3736,7 @@
       </p:grpSpPr>
       <p:sp>
         <p:nvSpPr>
-          <p:cNvPr id="1989133123" name="Text">
+          <p:cNvPr id="313727633" name="Text">
     </p:cNvPr>
           <p:cNvSpPr>
             <a:spLocks noGrp="1"/>
@@ -3782,7 +3782,7 @@
       </p:sp>
       <p:sp>
         <p:nvSpPr>
-          <p:cNvPr id="304179203" name="Text">
+          <p:cNvPr id="499260997" name="Text">
     </p:cNvPr>
           <p:cNvSpPr>
             <a:spLocks noGrp="1"/>
@@ -3846,7 +3846,7 @@
       </p:sp>
       <p:sp>
         <p:nvSpPr>
-          <p:cNvPr id="1730470048" name="Rectangle"/>
+          <p:cNvPr id="1383431431" name="Rectangle"/>
           <p:cNvSpPr>
             <a:spLocks noGrp="1"/>
           </p:cNvSpPr>
@@ -3880,7 +3880,7 @@
       </p:sp>
       <p:sp>
         <p:nvSpPr>
-          <p:cNvPr id="95161802" name="Rectangle"/>
+          <p:cNvPr id="914911836" name="Rectangle"/>
           <p:cNvSpPr>
             <a:spLocks noGrp="1"/>
           </p:cNvSpPr>
@@ -3914,7 +3914,7 @@
       </p:sp>
       <p:sp>
         <p:nvSpPr>
-          <p:cNvPr id="221332455" name="Rectangle"/>
+          <p:cNvPr id="1013289358" name="Rectangle"/>
           <p:cNvSpPr>
             <a:spLocks noGrp="1"/>
           </p:cNvSpPr>

</xml_diff>